<commit_message>
Dropdown login form nearly implemented - need to hide by default and show on click now + run from .js filee rather than from HTML
</commit_message>
<xml_diff>
--- a/Solution  Architecture.pptx
+++ b/Solution  Architecture.pptx
@@ -261,7 +261,7 @@
           <a:p>
             <a:fld id="{62034BF9-2864-F147-A5C4-CBEC520FE1E5}" type="datetimeFigureOut">
               <a:rPr lang="en-US" smtClean="0"/>
-              <a:t>11/8/22</a:t>
+              <a:t>11/12/22</a:t>
             </a:fld>
             <a:endParaRPr lang="en-US"/>
           </a:p>
@@ -461,7 +461,7 @@
           <a:p>
             <a:fld id="{62034BF9-2864-F147-A5C4-CBEC520FE1E5}" type="datetimeFigureOut">
               <a:rPr lang="en-US" smtClean="0"/>
-              <a:t>11/8/22</a:t>
+              <a:t>11/12/22</a:t>
             </a:fld>
             <a:endParaRPr lang="en-US"/>
           </a:p>
@@ -671,7 +671,7 @@
           <a:p>
             <a:fld id="{62034BF9-2864-F147-A5C4-CBEC520FE1E5}" type="datetimeFigureOut">
               <a:rPr lang="en-US" smtClean="0"/>
-              <a:t>11/8/22</a:t>
+              <a:t>11/12/22</a:t>
             </a:fld>
             <a:endParaRPr lang="en-US"/>
           </a:p>
@@ -871,7 +871,7 @@
           <a:p>
             <a:fld id="{62034BF9-2864-F147-A5C4-CBEC520FE1E5}" type="datetimeFigureOut">
               <a:rPr lang="en-US" smtClean="0"/>
-              <a:t>11/8/22</a:t>
+              <a:t>11/12/22</a:t>
             </a:fld>
             <a:endParaRPr lang="en-US"/>
           </a:p>
@@ -1147,7 +1147,7 @@
           <a:p>
             <a:fld id="{62034BF9-2864-F147-A5C4-CBEC520FE1E5}" type="datetimeFigureOut">
               <a:rPr lang="en-US" smtClean="0"/>
-              <a:t>11/8/22</a:t>
+              <a:t>11/12/22</a:t>
             </a:fld>
             <a:endParaRPr lang="en-US"/>
           </a:p>
@@ -1415,7 +1415,7 @@
           <a:p>
             <a:fld id="{62034BF9-2864-F147-A5C4-CBEC520FE1E5}" type="datetimeFigureOut">
               <a:rPr lang="en-US" smtClean="0"/>
-              <a:t>11/8/22</a:t>
+              <a:t>11/12/22</a:t>
             </a:fld>
             <a:endParaRPr lang="en-US"/>
           </a:p>
@@ -1830,7 +1830,7 @@
           <a:p>
             <a:fld id="{62034BF9-2864-F147-A5C4-CBEC520FE1E5}" type="datetimeFigureOut">
               <a:rPr lang="en-US" smtClean="0"/>
-              <a:t>11/8/22</a:t>
+              <a:t>11/12/22</a:t>
             </a:fld>
             <a:endParaRPr lang="en-US"/>
           </a:p>
@@ -1972,7 +1972,7 @@
           <a:p>
             <a:fld id="{62034BF9-2864-F147-A5C4-CBEC520FE1E5}" type="datetimeFigureOut">
               <a:rPr lang="en-US" smtClean="0"/>
-              <a:t>11/8/22</a:t>
+              <a:t>11/12/22</a:t>
             </a:fld>
             <a:endParaRPr lang="en-US"/>
           </a:p>
@@ -2085,7 +2085,7 @@
           <a:p>
             <a:fld id="{62034BF9-2864-F147-A5C4-CBEC520FE1E5}" type="datetimeFigureOut">
               <a:rPr lang="en-US" smtClean="0"/>
-              <a:t>11/8/22</a:t>
+              <a:t>11/12/22</a:t>
             </a:fld>
             <a:endParaRPr lang="en-US"/>
           </a:p>
@@ -2398,7 +2398,7 @@
           <a:p>
             <a:fld id="{62034BF9-2864-F147-A5C4-CBEC520FE1E5}" type="datetimeFigureOut">
               <a:rPr lang="en-US" smtClean="0"/>
-              <a:t>11/8/22</a:t>
+              <a:t>11/12/22</a:t>
             </a:fld>
             <a:endParaRPr lang="en-US"/>
           </a:p>
@@ -2687,7 +2687,7 @@
           <a:p>
             <a:fld id="{62034BF9-2864-F147-A5C4-CBEC520FE1E5}" type="datetimeFigureOut">
               <a:rPr lang="en-US" smtClean="0"/>
-              <a:t>11/8/22</a:t>
+              <a:t>11/12/22</a:t>
             </a:fld>
             <a:endParaRPr lang="en-US"/>
           </a:p>
@@ -2930,7 +2930,7 @@
           <a:p>
             <a:fld id="{62034BF9-2864-F147-A5C4-CBEC520FE1E5}" type="datetimeFigureOut">
               <a:rPr lang="en-US" smtClean="0"/>
-              <a:t>11/8/22</a:t>
+              <a:t>11/12/22</a:t>
             </a:fld>
             <a:endParaRPr lang="en-US"/>
           </a:p>
@@ -3418,8 +3418,8 @@
         </p:nvSpPr>
         <p:spPr>
           <a:xfrm>
-            <a:off x="1245128" y="953811"/>
-            <a:ext cx="2408663" cy="3638268"/>
+            <a:off x="1904275" y="1940312"/>
+            <a:ext cx="1670338" cy="2102712"/>
           </a:xfrm>
           <a:prstGeom prst="rect">
             <a:avLst/>
@@ -4356,7 +4356,7 @@
         </p:nvSpPr>
         <p:spPr>
           <a:xfrm>
-            <a:off x="1287391" y="5432406"/>
+            <a:off x="6909832" y="5462558"/>
             <a:ext cx="1730938" cy="1343123"/>
           </a:xfrm>
           <a:prstGeom prst="can">
@@ -4405,7 +4405,7 @@
         </p:nvSpPr>
         <p:spPr>
           <a:xfrm>
-            <a:off x="1304053" y="5896236"/>
+            <a:off x="6959912" y="5980872"/>
             <a:ext cx="2010937" cy="584775"/>
           </a:xfrm>
           <a:prstGeom prst="rect">
@@ -4520,7 +4520,7 @@
         </p:nvSpPr>
         <p:spPr>
           <a:xfrm>
-            <a:off x="1524153" y="4747411"/>
+            <a:off x="7146594" y="4777563"/>
             <a:ext cx="447830" cy="594522"/>
           </a:xfrm>
           <a:prstGeom prst="downArrow">
@@ -4569,7 +4569,7 @@
         </p:nvSpPr>
         <p:spPr>
           <a:xfrm rot="10800000">
-            <a:off x="2225544" y="4747411"/>
+            <a:off x="7847985" y="4777563"/>
             <a:ext cx="447830" cy="594522"/>
           </a:xfrm>
           <a:prstGeom prst="downArrow">
@@ -4618,7 +4618,7 @@
         </p:nvSpPr>
         <p:spPr>
           <a:xfrm>
-            <a:off x="48543" y="4783618"/>
+            <a:off x="8716360" y="5674356"/>
             <a:ext cx="1585572" cy="738664"/>
           </a:xfrm>
           <a:prstGeom prst="rect">
@@ -4657,7 +4657,7 @@
         </p:nvSpPr>
         <p:spPr>
           <a:xfrm>
-            <a:off x="1598354" y="1482002"/>
+            <a:off x="2028922" y="2742595"/>
             <a:ext cx="2538760" cy="646331"/>
           </a:xfrm>
           <a:prstGeom prst="rect">
@@ -4734,8 +4734,8 @@
         </p:nvSpPr>
         <p:spPr>
           <a:xfrm>
-            <a:off x="4032162" y="4888164"/>
-            <a:ext cx="2538760" cy="1876353"/>
+            <a:off x="2263698" y="4930134"/>
+            <a:ext cx="2279640" cy="1749445"/>
           </a:xfrm>
           <a:prstGeom prst="flowChartMerge">
             <a:avLst/>
@@ -4797,8 +4797,8 @@
         </p:blipFill>
         <p:spPr>
           <a:xfrm>
-            <a:off x="4791817" y="5301925"/>
-            <a:ext cx="914400" cy="914400"/>
+            <a:off x="3013044" y="5500276"/>
+            <a:ext cx="780948" cy="780948"/>
           </a:xfrm>
           <a:prstGeom prst="rect">
             <a:avLst/>
@@ -4819,8 +4819,8 @@
         </p:nvSpPr>
         <p:spPr>
           <a:xfrm>
-            <a:off x="4295482" y="4874068"/>
-            <a:ext cx="2538760" cy="738664"/>
+            <a:off x="2500003" y="4995605"/>
+            <a:ext cx="2538760" cy="784830"/>
           </a:xfrm>
           <a:prstGeom prst="rect">
             <a:avLst/>
@@ -4834,13 +4834,19 @@
           <a:lstStyle/>
           <a:p>
             <a:r>
-              <a:rPr lang="en-US" sz="1150" b="1" dirty="0"/>
-              <a:t>Validator: Irish Medical Council &amp; </a:t>
-            </a:r>
-          </a:p>
-          <a:p>
-            <a:r>
-              <a:rPr lang="en-US" sz="1150" b="1" dirty="0"/>
+              <a:rPr lang="en-US" sz="900" b="1" dirty="0"/>
+              <a:t>Validator: Irish Medical Council </a:t>
+            </a:r>
+          </a:p>
+          <a:p>
+            <a:r>
+              <a:rPr lang="en-US" sz="900" b="1" dirty="0"/>
+              <a:t>                           &amp; </a:t>
+            </a:r>
+          </a:p>
+          <a:p>
+            <a:r>
+              <a:rPr lang="en-US" sz="900" b="1" dirty="0"/>
               <a:t>Pharma Society  of Ireland</a:t>
             </a:r>
           </a:p>
@@ -4862,9 +4868,9 @@
           <p:nvPr/>
         </p:nvSpPr>
         <p:spPr>
-          <a:xfrm rot="17730742">
-            <a:off x="3315188" y="4621752"/>
-            <a:ext cx="545143" cy="789344"/>
+          <a:xfrm rot="2918574">
+            <a:off x="4733414" y="4169437"/>
+            <a:ext cx="712946" cy="973616"/>
           </a:xfrm>
           <a:prstGeom prst="downArrow">
             <a:avLst/>
@@ -4900,10 +4906,10 @@
       </p:sp>
       <p:sp>
         <p:nvSpPr>
-          <p:cNvPr id="46" name="Down Arrow 45">
-            <a:extLst>
-              <a:ext uri="{FF2B5EF4-FFF2-40B4-BE49-F238E27FC236}">
-                <a16:creationId xmlns:a16="http://schemas.microsoft.com/office/drawing/2014/main" id="{A9F82229-4745-6E00-842C-B206D0544A88}"/>
+          <p:cNvPr id="48" name="Down Arrow 47">
+            <a:extLst>
+              <a:ext uri="{FF2B5EF4-FFF2-40B4-BE49-F238E27FC236}">
+                <a16:creationId xmlns:a16="http://schemas.microsoft.com/office/drawing/2014/main" id="{51E78617-A946-F93F-7C46-84EB93BD0BFE}"/>
               </a:ext>
             </a:extLst>
           </p:cNvPr>
@@ -4911,9 +4917,9 @@
           <p:nvPr/>
         </p:nvSpPr>
         <p:spPr>
-          <a:xfrm rot="5400000">
-            <a:off x="3387173" y="5580644"/>
-            <a:ext cx="736657" cy="914399"/>
+          <a:xfrm rot="13496375">
+            <a:off x="5007788" y="4617146"/>
+            <a:ext cx="546553" cy="1464919"/>
           </a:xfrm>
           <a:prstGeom prst="downArrow">
             <a:avLst/>
@@ -4949,10 +4955,10 @@
       </p:sp>
       <p:sp>
         <p:nvSpPr>
-          <p:cNvPr id="47" name="TextBox 46">
-            <a:extLst>
-              <a:ext uri="{FF2B5EF4-FFF2-40B4-BE49-F238E27FC236}">
-                <a16:creationId xmlns:a16="http://schemas.microsoft.com/office/drawing/2014/main" id="{3B08E663-CBAE-A215-2B50-9351DB568468}"/>
+          <p:cNvPr id="49" name="TextBox 48">
+            <a:extLst>
+              <a:ext uri="{FF2B5EF4-FFF2-40B4-BE49-F238E27FC236}">
+                <a16:creationId xmlns:a16="http://schemas.microsoft.com/office/drawing/2014/main" id="{DF2E4871-F0F8-D5DB-93A9-E12E9CA53AC3}"/>
               </a:ext>
             </a:extLst>
           </p:cNvPr>
@@ -4960,9 +4966,9 @@
           <p:nvPr/>
         </p:nvSpPr>
         <p:spPr>
-          <a:xfrm>
-            <a:off x="3298302" y="5911625"/>
-            <a:ext cx="2538760" cy="553998"/>
+          <a:xfrm rot="18799611">
+            <a:off x="4480559" y="4763356"/>
+            <a:ext cx="2538760" cy="507831"/>
           </a:xfrm>
           <a:prstGeom prst="rect">
             <a:avLst/>
@@ -4976,8 +4982,8 @@
           <a:lstStyle/>
           <a:p>
             <a:r>
-              <a:rPr lang="en-US" sz="1200" b="1" dirty="0"/>
-              <a:t>Registration</a:t>
+              <a:rPr lang="en-US" sz="900" b="1" dirty="0"/>
+              <a:t>Approval / Rejection</a:t>
             </a:r>
           </a:p>
           <a:p>
@@ -4987,59 +4993,10 @@
       </p:sp>
       <p:sp>
         <p:nvSpPr>
-          <p:cNvPr id="48" name="Down Arrow 47">
-            <a:extLst>
-              <a:ext uri="{FF2B5EF4-FFF2-40B4-BE49-F238E27FC236}">
-                <a16:creationId xmlns:a16="http://schemas.microsoft.com/office/drawing/2014/main" id="{51E78617-A946-F93F-7C46-84EB93BD0BFE}"/>
-              </a:ext>
-            </a:extLst>
-          </p:cNvPr>
-          <p:cNvSpPr/>
-          <p:nvPr/>
-        </p:nvSpPr>
-        <p:spPr>
-          <a:xfrm rot="7826565">
-            <a:off x="3726098" y="4071703"/>
-            <a:ext cx="595456" cy="747351"/>
-          </a:xfrm>
-          <a:prstGeom prst="downArrow">
-            <a:avLst/>
-          </a:prstGeom>
-          <a:solidFill>
-            <a:srgbClr val="00B050"/>
-          </a:solidFill>
-        </p:spPr>
-        <p:style>
-          <a:lnRef idx="2">
-            <a:schemeClr val="accent1">
-              <a:shade val="50000"/>
-            </a:schemeClr>
-          </a:lnRef>
-          <a:fillRef idx="1">
-            <a:schemeClr val="accent1"/>
-          </a:fillRef>
-          <a:effectRef idx="0">
-            <a:schemeClr val="accent1"/>
-          </a:effectRef>
-          <a:fontRef idx="minor">
-            <a:schemeClr val="lt1"/>
-          </a:fontRef>
-        </p:style>
-        <p:txBody>
-          <a:bodyPr rtlCol="0" anchor="ctr"/>
-          <a:lstStyle/>
-          <a:p>
-            <a:pPr algn="ctr"/>
-            <a:endParaRPr lang="en-US"/>
-          </a:p>
-        </p:txBody>
-      </p:sp>
-      <p:sp>
-        <p:nvSpPr>
-          <p:cNvPr id="49" name="TextBox 48">
-            <a:extLst>
-              <a:ext uri="{FF2B5EF4-FFF2-40B4-BE49-F238E27FC236}">
-                <a16:creationId xmlns:a16="http://schemas.microsoft.com/office/drawing/2014/main" id="{DF2E4871-F0F8-D5DB-93A9-E12E9CA53AC3}"/>
+          <p:cNvPr id="50" name="TextBox 49">
+            <a:extLst>
+              <a:ext uri="{FF2B5EF4-FFF2-40B4-BE49-F238E27FC236}">
+                <a16:creationId xmlns:a16="http://schemas.microsoft.com/office/drawing/2014/main" id="{14216849-A9EB-B8D0-A3E6-263195B040D8}"/>
               </a:ext>
             </a:extLst>
           </p:cNvPr>
@@ -5047,46 +5004,8 @@
           <p:nvPr/>
         </p:nvSpPr>
         <p:spPr>
-          <a:xfrm rot="1759046">
-            <a:off x="3566296" y="4814766"/>
-            <a:ext cx="2538760" cy="507831"/>
-          </a:xfrm>
-          <a:prstGeom prst="rect">
-            <a:avLst/>
-          </a:prstGeom>
-          <a:noFill/>
-        </p:spPr>
-        <p:txBody>
-          <a:bodyPr wrap="square" rtlCol="0">
-            <a:spAutoFit/>
-          </a:bodyPr>
-          <a:lstStyle/>
-          <a:p>
-            <a:r>
-              <a:rPr lang="en-US" sz="900" b="1" dirty="0"/>
-              <a:t>Rejection</a:t>
-            </a:r>
-          </a:p>
-          <a:p>
-            <a:endParaRPr lang="en-US" dirty="0"/>
-          </a:p>
-        </p:txBody>
-      </p:sp>
-      <p:sp>
-        <p:nvSpPr>
-          <p:cNvPr id="50" name="TextBox 49">
-            <a:extLst>
-              <a:ext uri="{FF2B5EF4-FFF2-40B4-BE49-F238E27FC236}">
-                <a16:creationId xmlns:a16="http://schemas.microsoft.com/office/drawing/2014/main" id="{14216849-A9EB-B8D0-A3E6-263195B040D8}"/>
-              </a:ext>
-            </a:extLst>
-          </p:cNvPr>
-          <p:cNvSpPr txBox="1"/>
-          <p:nvPr/>
-        </p:nvSpPr>
-        <p:spPr>
-          <a:xfrm rot="1759046">
-            <a:off x="2963307" y="5308499"/>
+          <a:xfrm rot="18883459">
+            <a:off x="4536515" y="3836271"/>
             <a:ext cx="2538760" cy="507831"/>
           </a:xfrm>
           <a:prstGeom prst="rect">

</xml_diff>